<commit_message>
Fixed-README BUG and added Product documentation link
</commit_message>
<xml_diff>
--- a/11-Outrun/Consensus-Launch.pptx
+++ b/11-Outrun/Consensus-Launch.pptx
@@ -3746,7 +3746,7 @@
         <p:spPr>
           <a:xfrm>
             <a:off x="6002020" y="5287010"/>
-            <a:ext cx="5550535" cy="922020"/>
+            <a:ext cx="6711950" cy="922020"/>
           </a:xfrm>
           <a:prstGeom prst="rect">
             <a:avLst/>
@@ -3768,9 +3768,21 @@
                 <a:cs typeface="微软雅黑" panose="020B0503020204020204" charset="-122"/>
                 <a:sym typeface="微软雅黑" panose="020B0503020204020204" charset="-122"/>
               </a:rPr>
-              <a:t>产品文档：https://outrun.gitbook.io</a:t>
-            </a:r>
-            <a:endParaRPr lang="en-US" b="1">
+              <a:t>产品文档：</a:t>
+            </a:r>
+            <a:r>
+              <a:rPr lang="en-US" altLang="zh-CN" b="1">
+                <a:solidFill>
+                  <a:srgbClr val="FFFFFF"/>
+                </a:solidFill>
+                <a:latin typeface="微软雅黑" panose="020B0503020204020204" charset="-122"/>
+                <a:ea typeface="微软雅黑" panose="020B0503020204020204" charset="-122"/>
+                <a:cs typeface="微软雅黑" panose="020B0503020204020204" charset="-122"/>
+                <a:sym typeface="微软雅黑" panose="020B0503020204020204" charset="-122"/>
+              </a:rPr>
+              <a:t>https://outrun.gitbook.io/doc/memeverse</a:t>
+            </a:r>
+            <a:endParaRPr lang="en-US" altLang="zh-CN" b="1">
               <a:solidFill>
                 <a:srgbClr val="FFFFFF"/>
               </a:solidFill>
@@ -6935,113 +6947,11 @@
           <p:cNvPicPr>
             <a:picLocks noChangeAspect="1"/>
           </p:cNvPicPr>
-          <p:nvPr/>
-        </p:nvPicPr>
-        <p:blipFill>
-          <a:blip r:embed="rId1"/>
-          <a:stretch>
-            <a:fillRect/>
-          </a:stretch>
-        </p:blipFill>
-        <p:spPr>
-          <a:xfrm>
-            <a:off x="793790" y="1834039"/>
-            <a:ext cx="566976" cy="566976"/>
-          </a:xfrm>
-          <a:prstGeom prst="rect">
-            <a:avLst/>
-          </a:prstGeom>
-        </p:spPr>
-      </p:pic>
-      <p:sp>
-        <p:nvSpPr>
-          <p:cNvPr id="4" name="Text 1"/>
-          <p:cNvSpPr/>
-          <p:nvPr/>
-        </p:nvSpPr>
-        <p:spPr>
-          <a:xfrm>
-            <a:off x="793790" y="2684502"/>
-            <a:ext cx="2977039" cy="372070"/>
-          </a:xfrm>
-          <a:prstGeom prst="rect">
-            <a:avLst/>
-          </a:prstGeom>
-          <a:noFill/>
-        </p:spPr>
-        <p:txBody>
-          <a:bodyPr wrap="none" lIns="0" tIns="0" rIns="0" bIns="0" rtlCol="0" anchor="t"/>
-          <a:lstStyle/>
-          <a:p>
-            <a:pPr marL="0" indent="0" algn="l">
-              <a:lnSpc>
-                <a:spcPts val="2900"/>
-              </a:lnSpc>
-              <a:buNone/>
-            </a:pPr>
-            <a:r>
-              <a:rPr lang="en-US" sz="2300" b="1" dirty="0">
-                <a:solidFill>
-                  <a:srgbClr val="E0D6DE"/>
-                </a:solidFill>
-                <a:latin typeface="Petrona Bold" pitchFamily="34" charset="0"/>
-                <a:ea typeface="Petrona Bold" pitchFamily="34" charset="-122"/>
-                <a:cs typeface="Petrona Bold" pitchFamily="34" charset="-120"/>
-              </a:rPr>
-              <a:t>激活参与</a:t>
-            </a:r>
-            <a:endParaRPr lang="en-US" sz="2300" dirty="0"/>
-          </a:p>
-        </p:txBody>
-      </p:sp>
-      <p:sp>
-        <p:nvSpPr>
-          <p:cNvPr id="5" name="Text 2"/>
-          <p:cNvSpPr/>
-          <p:nvPr/>
-        </p:nvSpPr>
-        <p:spPr>
-          <a:xfrm>
-            <a:off x="793790" y="3192661"/>
-            <a:ext cx="6379607" cy="725805"/>
-          </a:xfrm>
-          <a:prstGeom prst="rect">
-            <a:avLst/>
-          </a:prstGeom>
-          <a:noFill/>
-        </p:spPr>
-        <p:txBody>
-          <a:bodyPr wrap="square" lIns="0" tIns="0" rIns="0" bIns="0" rtlCol="0" anchor="t"/>
-          <a:lstStyle/>
-          <a:p>
-            <a:pPr marL="0" indent="0" algn="l">
-              <a:lnSpc>
-                <a:spcPts val="2850"/>
-              </a:lnSpc>
-              <a:buNone/>
-            </a:pPr>
-            <a:r>
-              <a:rPr lang="en-US" sz="1750" dirty="0">
-                <a:solidFill>
-                  <a:srgbClr val="E0D6DE"/>
-                </a:solidFill>
-                <a:latin typeface="Inter" panose="02000503000000020004" pitchFamily="34" charset="0"/>
-                <a:ea typeface="Inter" panose="02000503000000020004" pitchFamily="34" charset="-122"/>
-                <a:cs typeface="Inter" panose="02000503000000020004" pitchFamily="34" charset="-120"/>
-              </a:rPr>
-              <a:t>将投票行为与直接经济回报挂钩，提供强大的正反馈，激励用户积极参与投票，从“冷眼旁观”到“主动出击”。</a:t>
-            </a:r>
-            <a:endParaRPr lang="en-US" sz="1750" dirty="0"/>
-          </a:p>
-        </p:txBody>
-      </p:sp>
-      <p:pic>
-        <p:nvPicPr>
-          <p:cNvPr id="6" name="Image 1" descr="preencoded.png"/>
-          <p:cNvPicPr>
-            <a:picLocks noChangeAspect="1"/>
-          </p:cNvPicPr>
-          <p:nvPr/>
+          <p:nvPr>
+            <p:custDataLst>
+              <p:tags r:id="rId1"/>
+            </p:custDataLst>
+          </p:nvPr>
         </p:nvPicPr>
         <p:blipFill>
           <a:blip r:embed="rId2"/>
@@ -7051,7 +6961,7 @@
         </p:blipFill>
         <p:spPr>
           <a:xfrm>
-            <a:off x="7456884" y="1834039"/>
+            <a:off x="793790" y="1834039"/>
             <a:ext cx="566976" cy="566976"/>
           </a:xfrm>
           <a:prstGeom prst="rect">
@@ -7061,13 +6971,17 @@
       </p:pic>
       <p:sp>
         <p:nvSpPr>
-          <p:cNvPr id="7" name="Text 3"/>
-          <p:cNvSpPr/>
-          <p:nvPr/>
-        </p:nvSpPr>
-        <p:spPr>
-          <a:xfrm>
-            <a:off x="7456884" y="2684502"/>
+          <p:cNvPr id="4" name="Text 1"/>
+          <p:cNvSpPr/>
+          <p:nvPr>
+            <p:custDataLst>
+              <p:tags r:id="rId3"/>
+            </p:custDataLst>
+          </p:nvPr>
+        </p:nvSpPr>
+        <p:spPr>
+          <a:xfrm>
+            <a:off x="793790" y="2684502"/>
             <a:ext cx="2977039" cy="372070"/>
           </a:xfrm>
           <a:prstGeom prst="rect">
@@ -7094,7 +7008,7 @@
                 <a:ea typeface="Petrona Bold" pitchFamily="34" charset="-122"/>
                 <a:cs typeface="Petrona Bold" pitchFamily="34" charset="-120"/>
               </a:rPr>
-              <a:t>优化决策</a:t>
+              <a:t>激活参与</a:t>
             </a:r>
             <a:endParaRPr lang="en-US" sz="2300" dirty="0"/>
           </a:p>
@@ -7102,14 +7016,18 @@
       </p:sp>
       <p:sp>
         <p:nvSpPr>
-          <p:cNvPr id="8" name="Text 4"/>
-          <p:cNvSpPr/>
-          <p:nvPr/>
-        </p:nvSpPr>
-        <p:spPr>
-          <a:xfrm>
-            <a:off x="7456884" y="3192661"/>
-            <a:ext cx="6379726" cy="1088708"/>
+          <p:cNvPr id="5" name="Text 2"/>
+          <p:cNvSpPr/>
+          <p:nvPr>
+            <p:custDataLst>
+              <p:tags r:id="rId4"/>
+            </p:custDataLst>
+          </p:nvPr>
+        </p:nvSpPr>
+        <p:spPr>
+          <a:xfrm>
+            <a:off x="793790" y="3192661"/>
+            <a:ext cx="6379607" cy="725805"/>
           </a:xfrm>
           <a:prstGeom prst="rect">
             <a:avLst/>
@@ -7135,6 +7053,124 @@
                 <a:ea typeface="Inter" panose="02000503000000020004" pitchFamily="34" charset="-122"/>
                 <a:cs typeface="Inter" panose="02000503000000020004" pitchFamily="34" charset="-120"/>
               </a:rPr>
+              <a:t>将投票行为与直接经济回报挂钩，提供强大的正反馈，激励用户积极参与投票，从“冷眼旁观”到“主动出击”。</a:t>
+            </a:r>
+            <a:endParaRPr lang="en-US" sz="1750" dirty="0"/>
+          </a:p>
+        </p:txBody>
+      </p:sp>
+      <p:pic>
+        <p:nvPicPr>
+          <p:cNvPr id="6" name="Image 1" descr="preencoded.png"/>
+          <p:cNvPicPr>
+            <a:picLocks noChangeAspect="1"/>
+          </p:cNvPicPr>
+          <p:nvPr>
+            <p:custDataLst>
+              <p:tags r:id="rId5"/>
+            </p:custDataLst>
+          </p:nvPr>
+        </p:nvPicPr>
+        <p:blipFill>
+          <a:blip r:embed="rId6"/>
+          <a:stretch>
+            <a:fillRect/>
+          </a:stretch>
+        </p:blipFill>
+        <p:spPr>
+          <a:xfrm>
+            <a:off x="7456884" y="1834039"/>
+            <a:ext cx="566976" cy="566976"/>
+          </a:xfrm>
+          <a:prstGeom prst="rect">
+            <a:avLst/>
+          </a:prstGeom>
+        </p:spPr>
+      </p:pic>
+      <p:sp>
+        <p:nvSpPr>
+          <p:cNvPr id="7" name="Text 3"/>
+          <p:cNvSpPr/>
+          <p:nvPr>
+            <p:custDataLst>
+              <p:tags r:id="rId7"/>
+            </p:custDataLst>
+          </p:nvPr>
+        </p:nvSpPr>
+        <p:spPr>
+          <a:xfrm>
+            <a:off x="7456884" y="2684502"/>
+            <a:ext cx="2977039" cy="372070"/>
+          </a:xfrm>
+          <a:prstGeom prst="rect">
+            <a:avLst/>
+          </a:prstGeom>
+          <a:noFill/>
+        </p:spPr>
+        <p:txBody>
+          <a:bodyPr wrap="none" lIns="0" tIns="0" rIns="0" bIns="0" rtlCol="0" anchor="t"/>
+          <a:lstStyle/>
+          <a:p>
+            <a:pPr marL="0" indent="0" algn="l">
+              <a:lnSpc>
+                <a:spcPts val="2900"/>
+              </a:lnSpc>
+              <a:buNone/>
+            </a:pPr>
+            <a:r>
+              <a:rPr lang="en-US" sz="2300" b="1" dirty="0">
+                <a:solidFill>
+                  <a:srgbClr val="E0D6DE"/>
+                </a:solidFill>
+                <a:latin typeface="Petrona Bold" pitchFamily="34" charset="0"/>
+                <a:ea typeface="Petrona Bold" pitchFamily="34" charset="-122"/>
+                <a:cs typeface="Petrona Bold" pitchFamily="34" charset="-120"/>
+              </a:rPr>
+              <a:t>优化决策</a:t>
+            </a:r>
+            <a:endParaRPr lang="en-US" sz="2300" dirty="0"/>
+          </a:p>
+        </p:txBody>
+      </p:sp>
+      <p:sp>
+        <p:nvSpPr>
+          <p:cNvPr id="8" name="Text 4"/>
+          <p:cNvSpPr/>
+          <p:nvPr>
+            <p:custDataLst>
+              <p:tags r:id="rId8"/>
+            </p:custDataLst>
+          </p:nvPr>
+        </p:nvSpPr>
+        <p:spPr>
+          <a:xfrm>
+            <a:off x="7456884" y="3192661"/>
+            <a:ext cx="6379726" cy="1088708"/>
+          </a:xfrm>
+          <a:prstGeom prst="rect">
+            <a:avLst/>
+          </a:prstGeom>
+          <a:noFill/>
+        </p:spPr>
+        <p:txBody>
+          <a:bodyPr wrap="square" lIns="0" tIns="0" rIns="0" bIns="0" rtlCol="0" anchor="t"/>
+          <a:lstStyle/>
+          <a:p>
+            <a:pPr marL="0" indent="0" algn="l">
+              <a:lnSpc>
+                <a:spcPts val="2850"/>
+              </a:lnSpc>
+              <a:buNone/>
+            </a:pPr>
+            <a:r>
+              <a:rPr lang="en-US" sz="1750" dirty="0">
+                <a:solidFill>
+                  <a:srgbClr val="E0D6DE"/>
+                </a:solidFill>
+                <a:latin typeface="Inter" panose="02000503000000020004" pitchFamily="34" charset="0"/>
+                <a:ea typeface="Inter" panose="02000503000000020004" pitchFamily="34" charset="-122"/>
+                <a:cs typeface="Inter" panose="02000503000000020004" pitchFamily="34" charset="-120"/>
+              </a:rPr>
               <a:t>成员利益与提案结果双向绑定，促使提案者提交高质量提案，投票者审慎研究，提升整体治理质量，从“随意点赞”到“深思熟虑”。</a:t>
             </a:r>
             <a:endParaRPr lang="en-US" sz="1750" dirty="0"/>
@@ -7147,10 +7183,14 @@
           <p:cNvPicPr>
             <a:picLocks noChangeAspect="1"/>
           </p:cNvPicPr>
-          <p:nvPr/>
+          <p:nvPr>
+            <p:custDataLst>
+              <p:tags r:id="rId9"/>
+            </p:custDataLst>
+          </p:nvPr>
         </p:nvPicPr>
         <p:blipFill>
-          <a:blip r:embed="rId3"/>
+          <a:blip r:embed="rId10"/>
           <a:stretch>
             <a:fillRect/>
           </a:stretch>
@@ -7169,7 +7209,11 @@
         <p:nvSpPr>
           <p:cNvPr id="10" name="Text 5"/>
           <p:cNvSpPr/>
-          <p:nvPr/>
+          <p:nvPr>
+            <p:custDataLst>
+              <p:tags r:id="rId11"/>
+            </p:custDataLst>
+          </p:nvPr>
         </p:nvSpPr>
         <p:spPr>
           <a:xfrm>
@@ -7210,7 +7254,11 @@
         <p:nvSpPr>
           <p:cNvPr id="11" name="Text 6"/>
           <p:cNvSpPr/>
-          <p:nvPr/>
+          <p:nvPr>
+            <p:custDataLst>
+              <p:tags r:id="rId12"/>
+            </p:custDataLst>
+          </p:nvPr>
         </p:nvSpPr>
         <p:spPr>
           <a:xfrm>
@@ -7253,10 +7301,14 @@
           <p:cNvPicPr>
             <a:picLocks noChangeAspect="1"/>
           </p:cNvPicPr>
-          <p:nvPr/>
+          <p:nvPr>
+            <p:custDataLst>
+              <p:tags r:id="rId13"/>
+            </p:custDataLst>
+          </p:nvPr>
         </p:nvPicPr>
         <p:blipFill>
-          <a:blip r:embed="rId4"/>
+          <a:blip r:embed="rId14"/>
           <a:stretch>
             <a:fillRect/>
           </a:stretch>
@@ -7275,7 +7327,11 @@
         <p:nvSpPr>
           <p:cNvPr id="13" name="Text 7"/>
           <p:cNvSpPr/>
-          <p:nvPr/>
+          <p:nvPr>
+            <p:custDataLst>
+              <p:tags r:id="rId15"/>
+            </p:custDataLst>
+          </p:nvPr>
         </p:nvSpPr>
         <p:spPr>
           <a:xfrm>
@@ -7316,7 +7372,11 @@
         <p:nvSpPr>
           <p:cNvPr id="14" name="Text 8"/>
           <p:cNvSpPr/>
-          <p:nvPr/>
+          <p:nvPr>
+            <p:custDataLst>
+              <p:tags r:id="rId16"/>
+            </p:custDataLst>
+          </p:nvPr>
         </p:nvSpPr>
         <p:spPr>
           <a:xfrm>
@@ -7347,7 +7407,7 @@
                 <a:ea typeface="Inter" panose="02000503000000020004" pitchFamily="34" charset="-122"/>
                 <a:cs typeface="Inter" panose="02000503000000020004" pitchFamily="34" charset="-120"/>
               </a:rPr>
-              <a:t>社区完全掌控奖励比例的动态调整，找到最适合自身的发展节奏，特别契合Memecoin DAO的高度去中心化需求，实现“一刀切”到“量体裁衣”。</a:t>
+              <a:t>社区完全掌控奖励比例的动态调整，找到最适合自身的发展节奏，实现“一刀切”到“量体裁衣”。</a:t>
             </a:r>
             <a:endParaRPr lang="en-US" sz="1750" dirty="0"/>
           </a:p>
@@ -7362,7 +7422,7 @@
           <p:nvPr/>
         </p:nvPicPr>
         <p:blipFill>
-          <a:blip r:embed="rId5"/>
+          <a:blip r:embed="rId17"/>
           <a:stretch>
             <a:fillRect/>
           </a:stretch>
@@ -8036,89 +8096,131 @@
 
 <file path=ppt/tags/tag1.xml><?xml version="1.0" encoding="utf-8"?>
 <p:tagLst xmlns:p="http://schemas.openxmlformats.org/presentationml/2006/main">
-  <p:tag name="KSO_WM_DIAGRAM_VIRTUALLY_FRAME" val="{&quot;height&quot;:447.4749606299212,&quot;left&quot;:62.50314960629921,&quot;top&quot;:192.37503937007872,&quot;width&quot;:1082.746850393701}"/>
+  <p:tag name="KSO_WM_DIAGRAM_VIRTUALLY_FRAME" val="{&quot;height&quot;:430.05,&quot;left&quot;:62.50314960629921,&quot;top&quot;:144.41251968503937,&quot;width&quot;:1026.9937007874018}"/>
 </p:tagLst>
 </file>
 
 <file path=ppt/tags/tag10.xml><?xml version="1.0" encoding="utf-8"?>
 <p:tagLst xmlns:p="http://schemas.openxmlformats.org/presentationml/2006/main">
-  <p:tag name="KSO_WM_DIAGRAM_VIRTUALLY_FRAME" val="{&quot;height&quot;:447.4749606299212,&quot;left&quot;:62.50314960629921,&quot;top&quot;:192.37503937007872,&quot;width&quot;:1082.746850393701}"/>
+  <p:tag name="KSO_WM_DIAGRAM_VIRTUALLY_FRAME" val="{&quot;height&quot;:430.05,&quot;left&quot;:62.50314960629921,&quot;top&quot;:144.41251968503937,&quot;width&quot;:1026.9937007874018}"/>
 </p:tagLst>
 </file>
 
 <file path=ppt/tags/tag11.xml><?xml version="1.0" encoding="utf-8"?>
 <p:tagLst xmlns:p="http://schemas.openxmlformats.org/presentationml/2006/main">
-  <p:tag name="KSO_WM_DIAGRAM_VIRTUALLY_FRAME" val="{&quot;height&quot;:372.90000000000003,&quot;left&quot;:62.50314960629921,&quot;top&quot;:211.2187401574803,&quot;width&quot;:1026.9937007874018}"/>
+  <p:tag name="KSO_WM_DIAGRAM_VIRTUALLY_FRAME" val="{&quot;height&quot;:430.05,&quot;left&quot;:62.50314960629921,&quot;top&quot;:144.41251968503937,&quot;width&quot;:1026.9937007874018}"/>
 </p:tagLst>
 </file>
 
 <file path=ppt/tags/tag12.xml><?xml version="1.0" encoding="utf-8"?>
 <p:tagLst xmlns:p="http://schemas.openxmlformats.org/presentationml/2006/main">
-  <p:tag name="KSO_WM_DIAGRAM_VIRTUALLY_FRAME" val="{&quot;height&quot;:372.90000000000003,&quot;left&quot;:62.50314960629921,&quot;top&quot;:211.2187401574803,&quot;width&quot;:1026.9937007874018}"/>
+  <p:tag name="KSO_WM_DIAGRAM_VIRTUALLY_FRAME" val="{&quot;height&quot;:430.05,&quot;left&quot;:62.50314960629921,&quot;top&quot;:144.41251968503937,&quot;width&quot;:1026.9937007874018}"/>
 </p:tagLst>
 </file>
 
 <file path=ppt/tags/tag13.xml><?xml version="1.0" encoding="utf-8"?>
 <p:tagLst xmlns:p="http://schemas.openxmlformats.org/presentationml/2006/main">
-  <p:tag name="KSO_WM_DIAGRAM_VIRTUALLY_FRAME" val="{&quot;height&quot;:372.90000000000003,&quot;left&quot;:62.50314960629921,&quot;top&quot;:211.2187401574803,&quot;width&quot;:1026.9937007874018}"/>
+  <p:tag name="KSO_WM_DIAGRAM_VIRTUALLY_FRAME" val="{&quot;height&quot;:447.4749606299212,&quot;left&quot;:62.50314960629921,&quot;top&quot;:192.37503937007872,&quot;width&quot;:1082.746850393701}"/>
 </p:tagLst>
 </file>
 
 <file path=ppt/tags/tag14.xml><?xml version="1.0" encoding="utf-8"?>
 <p:tagLst xmlns:p="http://schemas.openxmlformats.org/presentationml/2006/main">
-  <p:tag name="KSO_WM_DIAGRAM_VIRTUALLY_FRAME" val="{&quot;height&quot;:372.90000000000003,&quot;left&quot;:62.50314960629921,&quot;top&quot;:211.2187401574803,&quot;width&quot;:1026.9937007874018}"/>
+  <p:tag name="KSO_WM_DIAGRAM_VIRTUALLY_FRAME" val="{&quot;height&quot;:447.4749606299212,&quot;left&quot;:62.50314960629921,&quot;top&quot;:192.37503937007872,&quot;width&quot;:1082.746850393701}"/>
 </p:tagLst>
 </file>
 
 <file path=ppt/tags/tag15.xml><?xml version="1.0" encoding="utf-8"?>
 <p:tagLst xmlns:p="http://schemas.openxmlformats.org/presentationml/2006/main">
-  <p:tag name="KSO_WM_DIAGRAM_VIRTUALLY_FRAME" val="{&quot;height&quot;:372.90000000000003,&quot;left&quot;:62.50314960629921,&quot;top&quot;:211.2187401574803,&quot;width&quot;:1026.9937007874018}"/>
+  <p:tag name="KSO_WM_DIAGRAM_VIRTUALLY_FRAME" val="{&quot;height&quot;:447.4749606299212,&quot;left&quot;:62.50314960629921,&quot;top&quot;:192.37503937007872,&quot;width&quot;:1082.746850393701}"/>
 </p:tagLst>
 </file>
 
 <file path=ppt/tags/tag16.xml><?xml version="1.0" encoding="utf-8"?>
 <p:tagLst xmlns:p="http://schemas.openxmlformats.org/presentationml/2006/main">
-  <p:tag name="KSO_WM_DIAGRAM_VIRTUALLY_FRAME" val="{&quot;height&quot;:372.90000000000003,&quot;left&quot;:62.50314960629921,&quot;top&quot;:211.2187401574803,&quot;width&quot;:1026.9937007874018}"/>
+  <p:tag name="KSO_WM_DIAGRAM_VIRTUALLY_FRAME" val="{&quot;height&quot;:447.4749606299212,&quot;left&quot;:62.50314960629921,&quot;top&quot;:192.37503937007872,&quot;width&quot;:1082.746850393701}"/>
 </p:tagLst>
 </file>
 
 <file path=ppt/tags/tag17.xml><?xml version="1.0" encoding="utf-8"?>
 <p:tagLst xmlns:p="http://schemas.openxmlformats.org/presentationml/2006/main">
-  <p:tag name="KSO_WM_DIAGRAM_VIRTUALLY_FRAME" val="{&quot;height&quot;:372.90000000000003,&quot;left&quot;:62.50314960629921,&quot;top&quot;:211.2187401574803,&quot;width&quot;:1026.9937007874018}"/>
+  <p:tag name="KSO_WM_DIAGRAM_VIRTUALLY_FRAME" val="{&quot;height&quot;:447.4749606299212,&quot;left&quot;:62.50314960629921,&quot;top&quot;:192.37503937007872,&quot;width&quot;:1082.746850393701}"/>
 </p:tagLst>
 </file>
 
 <file path=ppt/tags/tag18.xml><?xml version="1.0" encoding="utf-8"?>
 <p:tagLst xmlns:p="http://schemas.openxmlformats.org/presentationml/2006/main">
-  <p:tag name="KSO_WM_DIAGRAM_VIRTUALLY_FRAME" val="{&quot;height&quot;:372.90000000000003,&quot;left&quot;:62.50314960629921,&quot;top&quot;:211.2187401574803,&quot;width&quot;:1026.9937007874018}"/>
+  <p:tag name="KSO_WM_DIAGRAM_VIRTUALLY_FRAME" val="{&quot;height&quot;:447.4749606299212,&quot;left&quot;:62.50314960629921,&quot;top&quot;:192.37503937007872,&quot;width&quot;:1082.746850393701}"/>
 </p:tagLst>
 </file>
 
 <file path=ppt/tags/tag19.xml><?xml version="1.0" encoding="utf-8"?>
 <p:tagLst xmlns:p="http://schemas.openxmlformats.org/presentationml/2006/main">
-  <p:tag name="KSO_WM_DIAGRAM_VIRTUALLY_FRAME" val="{&quot;height&quot;:372.90000000000003,&quot;left&quot;:62.50314960629921,&quot;top&quot;:211.2187401574803,&quot;width&quot;:1026.9937007874018}"/>
+  <p:tag name="KSO_WM_DIAGRAM_VIRTUALLY_FRAME" val="{&quot;height&quot;:447.4749606299212,&quot;left&quot;:62.50314960629921,&quot;top&quot;:192.37503937007872,&quot;width&quot;:1082.746850393701}"/>
 </p:tagLst>
 </file>
 
 <file path=ppt/tags/tag2.xml><?xml version="1.0" encoding="utf-8"?>
 <p:tagLst xmlns:p="http://schemas.openxmlformats.org/presentationml/2006/main">
-  <p:tag name="KSO_WM_DIAGRAM_VIRTUALLY_FRAME" val="{&quot;height&quot;:447.4749606299212,&quot;left&quot;:62.50314960629921,&quot;top&quot;:192.37503937007872,&quot;width&quot;:1082.746850393701}"/>
+  <p:tag name="KSO_WM_DIAGRAM_VIRTUALLY_FRAME" val="{&quot;height&quot;:430.05,&quot;left&quot;:62.50314960629921,&quot;top&quot;:144.41251968503937,&quot;width&quot;:1026.9937007874018}"/>
 </p:tagLst>
 </file>
 
 <file path=ppt/tags/tag20.xml><?xml version="1.0" encoding="utf-8"?>
 <p:tagLst xmlns:p="http://schemas.openxmlformats.org/presentationml/2006/main">
-  <p:tag name="KSO_WM_DIAGRAM_VIRTUALLY_FRAME" val="{&quot;height&quot;:372.90000000000003,&quot;left&quot;:62.50314960629921,&quot;top&quot;:211.2187401574803,&quot;width&quot;:1026.9937007874018}"/>
+  <p:tag name="KSO_WM_DIAGRAM_VIRTUALLY_FRAME" val="{&quot;height&quot;:447.4749606299212,&quot;left&quot;:62.50314960629921,&quot;top&quot;:192.37503937007872,&quot;width&quot;:1082.746850393701}"/>
 </p:tagLst>
 </file>
 
 <file path=ppt/tags/tag21.xml><?xml version="1.0" encoding="utf-8"?>
 <p:tagLst xmlns:p="http://schemas.openxmlformats.org/presentationml/2006/main">
+  <p:tag name="KSO_WM_DIAGRAM_VIRTUALLY_FRAME" val="{&quot;height&quot;:447.4749606299212,&quot;left&quot;:62.50314960629921,&quot;top&quot;:192.37503937007872,&quot;width&quot;:1082.746850393701}"/>
+</p:tagLst>
+</file>
+
+<file path=ppt/tags/tag22.xml><?xml version="1.0" encoding="utf-8"?>
+<p:tagLst xmlns:p="http://schemas.openxmlformats.org/presentationml/2006/main">
+  <p:tag name="KSO_WM_DIAGRAM_VIRTUALLY_FRAME" val="{&quot;height&quot;:447.4749606299212,&quot;left&quot;:62.50314960629921,&quot;top&quot;:192.37503937007872,&quot;width&quot;:1082.746850393701}"/>
+</p:tagLst>
+</file>
+
+<file path=ppt/tags/tag23.xml><?xml version="1.0" encoding="utf-8"?>
+<p:tagLst xmlns:p="http://schemas.openxmlformats.org/presentationml/2006/main">
   <p:tag name="KSO_WM_DIAGRAM_VIRTUALLY_FRAME" val="{&quot;height&quot;:372.90000000000003,&quot;left&quot;:62.50314960629921,&quot;top&quot;:211.2187401574803,&quot;width&quot;:1026.9937007874018}"/>
 </p:tagLst>
 </file>
 
-<file path=ppt/tags/tag22.xml><?xml version="1.0" encoding="utf-8"?>
+<file path=ppt/tags/tag24.xml><?xml version="1.0" encoding="utf-8"?>
+<p:tagLst xmlns:p="http://schemas.openxmlformats.org/presentationml/2006/main">
+  <p:tag name="KSO_WM_DIAGRAM_VIRTUALLY_FRAME" val="{&quot;height&quot;:372.90000000000003,&quot;left&quot;:62.50314960629921,&quot;top&quot;:211.2187401574803,&quot;width&quot;:1026.9937007874018}"/>
+</p:tagLst>
+</file>
+
+<file path=ppt/tags/tag25.xml><?xml version="1.0" encoding="utf-8"?>
+<p:tagLst xmlns:p="http://schemas.openxmlformats.org/presentationml/2006/main">
+  <p:tag name="KSO_WM_DIAGRAM_VIRTUALLY_FRAME" val="{&quot;height&quot;:372.90000000000003,&quot;left&quot;:62.50314960629921,&quot;top&quot;:211.2187401574803,&quot;width&quot;:1026.9937007874018}"/>
+</p:tagLst>
+</file>
+
+<file path=ppt/tags/tag26.xml><?xml version="1.0" encoding="utf-8"?>
+<p:tagLst xmlns:p="http://schemas.openxmlformats.org/presentationml/2006/main">
+  <p:tag name="KSO_WM_DIAGRAM_VIRTUALLY_FRAME" val="{&quot;height&quot;:372.90000000000003,&quot;left&quot;:62.50314960629921,&quot;top&quot;:211.2187401574803,&quot;width&quot;:1026.9937007874018}"/>
+</p:tagLst>
+</file>
+
+<file path=ppt/tags/tag27.xml><?xml version="1.0" encoding="utf-8"?>
+<p:tagLst xmlns:p="http://schemas.openxmlformats.org/presentationml/2006/main">
+  <p:tag name="KSO_WM_DIAGRAM_VIRTUALLY_FRAME" val="{&quot;height&quot;:372.90000000000003,&quot;left&quot;:62.50314960629921,&quot;top&quot;:211.2187401574803,&quot;width&quot;:1026.9937007874018}"/>
+</p:tagLst>
+</file>
+
+<file path=ppt/tags/tag28.xml><?xml version="1.0" encoding="utf-8"?>
+<p:tagLst xmlns:p="http://schemas.openxmlformats.org/presentationml/2006/main">
+  <p:tag name="KSO_WM_DIAGRAM_VIRTUALLY_FRAME" val="{&quot;height&quot;:372.90000000000003,&quot;left&quot;:62.50314960629921,&quot;top&quot;:211.2187401574803,&quot;width&quot;:1026.9937007874018}"/>
+</p:tagLst>
+</file>
+
+<file path=ppt/tags/tag29.xml><?xml version="1.0" encoding="utf-8"?>
 <p:tagLst xmlns:p="http://schemas.openxmlformats.org/presentationml/2006/main">
   <p:tag name="KSO_WM_DIAGRAM_VIRTUALLY_FRAME" val="{&quot;height&quot;:372.90000000000003,&quot;left&quot;:62.50314960629921,&quot;top&quot;:211.2187401574803,&quot;width&quot;:1026.9937007874018}"/>
 </p:tagLst>
@@ -8126,43 +8228,73 @@
 
 <file path=ppt/tags/tag3.xml><?xml version="1.0" encoding="utf-8"?>
 <p:tagLst xmlns:p="http://schemas.openxmlformats.org/presentationml/2006/main">
-  <p:tag name="KSO_WM_DIAGRAM_VIRTUALLY_FRAME" val="{&quot;height&quot;:447.4749606299212,&quot;left&quot;:62.50314960629921,&quot;top&quot;:192.37503937007872,&quot;width&quot;:1082.746850393701}"/>
+  <p:tag name="KSO_WM_DIAGRAM_VIRTUALLY_FRAME" val="{&quot;height&quot;:430.05,&quot;left&quot;:62.50314960629921,&quot;top&quot;:144.41251968503937,&quot;width&quot;:1026.9937007874018}"/>
+</p:tagLst>
+</file>
+
+<file path=ppt/tags/tag30.xml><?xml version="1.0" encoding="utf-8"?>
+<p:tagLst xmlns:p="http://schemas.openxmlformats.org/presentationml/2006/main">
+  <p:tag name="KSO_WM_DIAGRAM_VIRTUALLY_FRAME" val="{&quot;height&quot;:372.90000000000003,&quot;left&quot;:62.50314960629921,&quot;top&quot;:211.2187401574803,&quot;width&quot;:1026.9937007874018}"/>
+</p:tagLst>
+</file>
+
+<file path=ppt/tags/tag31.xml><?xml version="1.0" encoding="utf-8"?>
+<p:tagLst xmlns:p="http://schemas.openxmlformats.org/presentationml/2006/main">
+  <p:tag name="KSO_WM_DIAGRAM_VIRTUALLY_FRAME" val="{&quot;height&quot;:372.90000000000003,&quot;left&quot;:62.50314960629921,&quot;top&quot;:211.2187401574803,&quot;width&quot;:1026.9937007874018}"/>
+</p:tagLst>
+</file>
+
+<file path=ppt/tags/tag32.xml><?xml version="1.0" encoding="utf-8"?>
+<p:tagLst xmlns:p="http://schemas.openxmlformats.org/presentationml/2006/main">
+  <p:tag name="KSO_WM_DIAGRAM_VIRTUALLY_FRAME" val="{&quot;height&quot;:372.90000000000003,&quot;left&quot;:62.50314960629921,&quot;top&quot;:211.2187401574803,&quot;width&quot;:1026.9937007874018}"/>
+</p:tagLst>
+</file>
+
+<file path=ppt/tags/tag33.xml><?xml version="1.0" encoding="utf-8"?>
+<p:tagLst xmlns:p="http://schemas.openxmlformats.org/presentationml/2006/main">
+  <p:tag name="KSO_WM_DIAGRAM_VIRTUALLY_FRAME" val="{&quot;height&quot;:372.90000000000003,&quot;left&quot;:62.50314960629921,&quot;top&quot;:211.2187401574803,&quot;width&quot;:1026.9937007874018}"/>
+</p:tagLst>
+</file>
+
+<file path=ppt/tags/tag34.xml><?xml version="1.0" encoding="utf-8"?>
+<p:tagLst xmlns:p="http://schemas.openxmlformats.org/presentationml/2006/main">
+  <p:tag name="KSO_WM_DIAGRAM_VIRTUALLY_FRAME" val="{&quot;height&quot;:372.90000000000003,&quot;left&quot;:62.50314960629921,&quot;top&quot;:211.2187401574803,&quot;width&quot;:1026.9937007874018}"/>
 </p:tagLst>
 </file>
 
 <file path=ppt/tags/tag4.xml><?xml version="1.0" encoding="utf-8"?>
 <p:tagLst xmlns:p="http://schemas.openxmlformats.org/presentationml/2006/main">
-  <p:tag name="KSO_WM_DIAGRAM_VIRTUALLY_FRAME" val="{&quot;height&quot;:447.4749606299212,&quot;left&quot;:62.50314960629921,&quot;top&quot;:192.37503937007872,&quot;width&quot;:1082.746850393701}"/>
+  <p:tag name="KSO_WM_DIAGRAM_VIRTUALLY_FRAME" val="{&quot;height&quot;:430.05,&quot;left&quot;:62.50314960629921,&quot;top&quot;:144.41251968503937,&quot;width&quot;:1026.9937007874018}"/>
 </p:tagLst>
 </file>
 
 <file path=ppt/tags/tag5.xml><?xml version="1.0" encoding="utf-8"?>
 <p:tagLst xmlns:p="http://schemas.openxmlformats.org/presentationml/2006/main">
-  <p:tag name="KSO_WM_DIAGRAM_VIRTUALLY_FRAME" val="{&quot;height&quot;:447.4749606299212,&quot;left&quot;:62.50314960629921,&quot;top&quot;:192.37503937007872,&quot;width&quot;:1082.746850393701}"/>
+  <p:tag name="KSO_WM_DIAGRAM_VIRTUALLY_FRAME" val="{&quot;height&quot;:430.05,&quot;left&quot;:62.50314960629921,&quot;top&quot;:144.41251968503937,&quot;width&quot;:1026.9937007874018}"/>
 </p:tagLst>
 </file>
 
 <file path=ppt/tags/tag6.xml><?xml version="1.0" encoding="utf-8"?>
 <p:tagLst xmlns:p="http://schemas.openxmlformats.org/presentationml/2006/main">
-  <p:tag name="KSO_WM_DIAGRAM_VIRTUALLY_FRAME" val="{&quot;height&quot;:447.4749606299212,&quot;left&quot;:62.50314960629921,&quot;top&quot;:192.37503937007872,&quot;width&quot;:1082.746850393701}"/>
+  <p:tag name="KSO_WM_DIAGRAM_VIRTUALLY_FRAME" val="{&quot;height&quot;:430.05,&quot;left&quot;:62.50314960629921,&quot;top&quot;:144.41251968503937,&quot;width&quot;:1026.9937007874018}"/>
 </p:tagLst>
 </file>
 
 <file path=ppt/tags/tag7.xml><?xml version="1.0" encoding="utf-8"?>
 <p:tagLst xmlns:p="http://schemas.openxmlformats.org/presentationml/2006/main">
-  <p:tag name="KSO_WM_DIAGRAM_VIRTUALLY_FRAME" val="{&quot;height&quot;:447.4749606299212,&quot;left&quot;:62.50314960629921,&quot;top&quot;:192.37503937007872,&quot;width&quot;:1082.746850393701}"/>
+  <p:tag name="KSO_WM_DIAGRAM_VIRTUALLY_FRAME" val="{&quot;height&quot;:430.05,&quot;left&quot;:62.50314960629921,&quot;top&quot;:144.41251968503937,&quot;width&quot;:1026.9937007874018}"/>
 </p:tagLst>
 </file>
 
 <file path=ppt/tags/tag8.xml><?xml version="1.0" encoding="utf-8"?>
 <p:tagLst xmlns:p="http://schemas.openxmlformats.org/presentationml/2006/main">
-  <p:tag name="KSO_WM_DIAGRAM_VIRTUALLY_FRAME" val="{&quot;height&quot;:447.4749606299212,&quot;left&quot;:62.50314960629921,&quot;top&quot;:192.37503937007872,&quot;width&quot;:1082.746850393701}"/>
+  <p:tag name="KSO_WM_DIAGRAM_VIRTUALLY_FRAME" val="{&quot;height&quot;:430.05,&quot;left&quot;:62.50314960629921,&quot;top&quot;:144.41251968503937,&quot;width&quot;:1026.9937007874018}"/>
 </p:tagLst>
 </file>
 
 <file path=ppt/tags/tag9.xml><?xml version="1.0" encoding="utf-8"?>
 <p:tagLst xmlns:p="http://schemas.openxmlformats.org/presentationml/2006/main">
-  <p:tag name="KSO_WM_DIAGRAM_VIRTUALLY_FRAME" val="{&quot;height&quot;:447.4749606299212,&quot;left&quot;:62.50314960629921,&quot;top&quot;:192.37503937007872,&quot;width&quot;:1082.746850393701}"/>
+  <p:tag name="KSO_WM_DIAGRAM_VIRTUALLY_FRAME" val="{&quot;height&quot;:430.05,&quot;left&quot;:62.50314960629921,&quot;top&quot;:144.41251968503937,&quot;width&quot;:1026.9937007874018}"/>
 </p:tagLst>
 </file>
 

</xml_diff>